<commit_message>
add authomatic move after pressing the button
</commit_message>
<xml_diff>
--- a/Ball/ЭВМ.pptx
+++ b/Ball/ЭВМ.pptx
@@ -307,7 +307,7 @@
           <a:p>
             <a:fld id="{800E2027-201B-428F-B3A5-BE5FE89277BF}" type="datetimeFigureOut">
               <a:rPr lang="ru-RU" smtClean="0"/>
-              <a:t>08.12.2019</a:t>
+              <a:t>10.12.2019</a:t>
             </a:fld>
             <a:endParaRPr lang="ru-RU"/>
           </a:p>
@@ -582,7 +582,7 @@
           <a:p>
             <a:fld id="{800E2027-201B-428F-B3A5-BE5FE89277BF}" type="datetimeFigureOut">
               <a:rPr lang="ru-RU" smtClean="0"/>
-              <a:t>08.12.2019</a:t>
+              <a:t>10.12.2019</a:t>
             </a:fld>
             <a:endParaRPr lang="ru-RU"/>
           </a:p>
@@ -776,7 +776,7 @@
           <a:p>
             <a:fld id="{800E2027-201B-428F-B3A5-BE5FE89277BF}" type="datetimeFigureOut">
               <a:rPr lang="ru-RU" smtClean="0"/>
-              <a:t>08.12.2019</a:t>
+              <a:t>10.12.2019</a:t>
             </a:fld>
             <a:endParaRPr lang="ru-RU"/>
           </a:p>
@@ -1049,7 +1049,7 @@
           <a:p>
             <a:fld id="{800E2027-201B-428F-B3A5-BE5FE89277BF}" type="datetimeFigureOut">
               <a:rPr lang="ru-RU" smtClean="0"/>
-              <a:t>08.12.2019</a:t>
+              <a:t>10.12.2019</a:t>
             </a:fld>
             <a:endParaRPr lang="ru-RU"/>
           </a:p>
@@ -1390,7 +1390,7 @@
           <a:p>
             <a:fld id="{800E2027-201B-428F-B3A5-BE5FE89277BF}" type="datetimeFigureOut">
               <a:rPr lang="ru-RU" smtClean="0"/>
-              <a:t>08.12.2019</a:t>
+              <a:t>10.12.2019</a:t>
             </a:fld>
             <a:endParaRPr lang="ru-RU"/>
           </a:p>
@@ -2013,7 +2013,7 @@
           <a:p>
             <a:fld id="{800E2027-201B-428F-B3A5-BE5FE89277BF}" type="datetimeFigureOut">
               <a:rPr lang="ru-RU" smtClean="0"/>
-              <a:t>08.12.2019</a:t>
+              <a:t>10.12.2019</a:t>
             </a:fld>
             <a:endParaRPr lang="ru-RU"/>
           </a:p>
@@ -2873,7 +2873,7 @@
           <a:p>
             <a:fld id="{800E2027-201B-428F-B3A5-BE5FE89277BF}" type="datetimeFigureOut">
               <a:rPr lang="ru-RU" smtClean="0"/>
-              <a:t>08.12.2019</a:t>
+              <a:t>10.12.2019</a:t>
             </a:fld>
             <a:endParaRPr lang="ru-RU"/>
           </a:p>
@@ -3043,7 +3043,7 @@
           <a:p>
             <a:fld id="{800E2027-201B-428F-B3A5-BE5FE89277BF}" type="datetimeFigureOut">
               <a:rPr lang="ru-RU" smtClean="0"/>
-              <a:t>08.12.2019</a:t>
+              <a:t>10.12.2019</a:t>
             </a:fld>
             <a:endParaRPr lang="ru-RU"/>
           </a:p>
@@ -3223,7 +3223,7 @@
           <a:p>
             <a:fld id="{800E2027-201B-428F-B3A5-BE5FE89277BF}" type="datetimeFigureOut">
               <a:rPr lang="ru-RU" smtClean="0"/>
-              <a:t>08.12.2019</a:t>
+              <a:t>10.12.2019</a:t>
             </a:fld>
             <a:endParaRPr lang="ru-RU"/>
           </a:p>
@@ -3393,7 +3393,7 @@
           <a:p>
             <a:fld id="{800E2027-201B-428F-B3A5-BE5FE89277BF}" type="datetimeFigureOut">
               <a:rPr lang="ru-RU" smtClean="0"/>
-              <a:t>08.12.2019</a:t>
+              <a:t>10.12.2019</a:t>
             </a:fld>
             <a:endParaRPr lang="ru-RU"/>
           </a:p>
@@ -3640,7 +3640,7 @@
           <a:p>
             <a:fld id="{800E2027-201B-428F-B3A5-BE5FE89277BF}" type="datetimeFigureOut">
               <a:rPr lang="ru-RU" smtClean="0"/>
-              <a:t>08.12.2019</a:t>
+              <a:t>10.12.2019</a:t>
             </a:fld>
             <a:endParaRPr lang="ru-RU"/>
           </a:p>
@@ -3932,7 +3932,7 @@
           <a:p>
             <a:fld id="{800E2027-201B-428F-B3A5-BE5FE89277BF}" type="datetimeFigureOut">
               <a:rPr lang="ru-RU" smtClean="0"/>
-              <a:t>08.12.2019</a:t>
+              <a:t>10.12.2019</a:t>
             </a:fld>
             <a:endParaRPr lang="ru-RU"/>
           </a:p>
@@ -4376,7 +4376,7 @@
           <a:p>
             <a:fld id="{800E2027-201B-428F-B3A5-BE5FE89277BF}" type="datetimeFigureOut">
               <a:rPr lang="ru-RU" smtClean="0"/>
-              <a:t>08.12.2019</a:t>
+              <a:t>10.12.2019</a:t>
             </a:fld>
             <a:endParaRPr lang="ru-RU"/>
           </a:p>
@@ -4494,7 +4494,7 @@
           <a:p>
             <a:fld id="{800E2027-201B-428F-B3A5-BE5FE89277BF}" type="datetimeFigureOut">
               <a:rPr lang="ru-RU" smtClean="0"/>
-              <a:t>08.12.2019</a:t>
+              <a:t>10.12.2019</a:t>
             </a:fld>
             <a:endParaRPr lang="ru-RU"/>
           </a:p>
@@ -4589,7 +4589,7 @@
           <a:p>
             <a:fld id="{800E2027-201B-428F-B3A5-BE5FE89277BF}" type="datetimeFigureOut">
               <a:rPr lang="ru-RU" smtClean="0"/>
-              <a:t>08.12.2019</a:t>
+              <a:t>10.12.2019</a:t>
             </a:fld>
             <a:endParaRPr lang="ru-RU"/>
           </a:p>
@@ -4868,7 +4868,7 @@
           <a:p>
             <a:fld id="{800E2027-201B-428F-B3A5-BE5FE89277BF}" type="datetimeFigureOut">
               <a:rPr lang="ru-RU" smtClean="0"/>
-              <a:t>08.12.2019</a:t>
+              <a:t>10.12.2019</a:t>
             </a:fld>
             <a:endParaRPr lang="ru-RU"/>
           </a:p>
@@ -5143,7 +5143,7 @@
           <a:p>
             <a:fld id="{800E2027-201B-428F-B3A5-BE5FE89277BF}" type="datetimeFigureOut">
               <a:rPr lang="ru-RU" smtClean="0"/>
-              <a:t>08.12.2019</a:t>
+              <a:t>10.12.2019</a:t>
             </a:fld>
             <a:endParaRPr lang="ru-RU"/>
           </a:p>
@@ -5572,7 +5572,7 @@
           <a:p>
             <a:fld id="{800E2027-201B-428F-B3A5-BE5FE89277BF}" type="datetimeFigureOut">
               <a:rPr lang="ru-RU" smtClean="0"/>
-              <a:t>08.12.2019</a:t>
+              <a:t>10.12.2019</a:t>
             </a:fld>
             <a:endParaRPr lang="ru-RU"/>
           </a:p>
@@ -6183,11 +6183,7 @@
           <a:p>
             <a:r>
               <a:rPr lang="ru-RU" dirty="0" smtClean="0"/>
-              <a:t>							Агеев </a:t>
-            </a:r>
-            <a:r>
-              <a:rPr lang="ru-RU" dirty="0" smtClean="0"/>
-              <a:t>Андрей</a:t>
+              <a:t>							Агеев Андрей</a:t>
             </a:r>
             <a:r>
               <a:rPr lang="en-US" dirty="0"/>
@@ -6756,7 +6752,6 @@
               <a:rPr lang="en-US" dirty="0" smtClean="0"/>
               <a:t>:</a:t>
             </a:r>
-            <a:endParaRPr lang="en-US" dirty="0" smtClean="0"/>
           </a:p>
           <a:p>
             <a:pPr marL="0" indent="0">
@@ -6772,11 +6767,7 @@
             </a:r>
             <a:r>
               <a:rPr lang="en-US" dirty="0" smtClean="0"/>
-              <a:t>Arduino </a:t>
-            </a:r>
-            <a:r>
-              <a:rPr lang="en-US" dirty="0" smtClean="0"/>
-              <a:t>UNO</a:t>
+              <a:t>Arduino UNO</a:t>
             </a:r>
             <a:r>
               <a:rPr lang="ru-RU" dirty="0" smtClean="0"/>
@@ -7118,11 +7109,7 @@
             </a:r>
             <a:r>
               <a:rPr lang="ru-RU" dirty="0" smtClean="0"/>
-              <a:t>единственным возможным </a:t>
-            </a:r>
-            <a:r>
-              <a:rPr lang="ru-RU" dirty="0" smtClean="0"/>
-              <a:t>способом</a:t>
+              <a:t>единственным возможным способом</a:t>
             </a:r>
           </a:p>
           <a:p>
@@ -7479,15 +7466,7 @@
           <a:p>
             <a:r>
               <a:rPr lang="ru-RU" dirty="0" smtClean="0"/>
-              <a:t>Программная а</a:t>
-            </a:r>
-            <a:r>
-              <a:rPr lang="ru-RU" dirty="0" smtClean="0"/>
-              <a:t>рхитектура </a:t>
-            </a:r>
-            <a:r>
-              <a:rPr lang="ru-RU" dirty="0" smtClean="0"/>
-              <a:t>проекта</a:t>
+              <a:t>Программная архитектура проекта</a:t>
             </a:r>
             <a:endParaRPr lang="ru-RU" dirty="0"/>
           </a:p>
@@ -7513,6 +7492,30 @@
           <a:xfrm>
             <a:off x="3546763" y="1422399"/>
             <a:ext cx="6216073" cy="4927600"/>
+          </a:xfrm>
+          <a:prstGeom prst="rect">
+            <a:avLst/>
+          </a:prstGeom>
+        </p:spPr>
+      </p:pic>
+      <p:pic>
+        <p:nvPicPr>
+          <p:cNvPr id="5" name="Рисунок 4"/>
+          <p:cNvPicPr>
+            <a:picLocks noChangeAspect="1"/>
+          </p:cNvPicPr>
+          <p:nvPr/>
+        </p:nvPicPr>
+        <p:blipFill>
+          <a:blip r:embed="rId3"/>
+          <a:stretch>
+            <a:fillRect/>
+          </a:stretch>
+        </p:blipFill>
+        <p:spPr>
+          <a:xfrm>
+            <a:off x="3546763" y="5006110"/>
+            <a:ext cx="6216072" cy="1343889"/>
           </a:xfrm>
           <a:prstGeom prst="rect">
             <a:avLst/>
@@ -7609,11 +7612,7 @@
             </a:pPr>
             <a:r>
               <a:rPr lang="ru-RU" dirty="0" smtClean="0"/>
-              <a:t>Пользователь с </a:t>
-            </a:r>
-            <a:r>
-              <a:rPr lang="ru-RU" dirty="0" smtClean="0"/>
-              <a:t>помощью кнопок управляет мячом , доводя его до финиша(фиолетового квадрата)</a:t>
+              <a:t>Пользователь с помощью кнопок управляет мячом , доводя его до финиша(фиолетового квадрата)</a:t>
             </a:r>
           </a:p>
           <a:p>
@@ -7631,11 +7630,7 @@
             </a:pPr>
             <a:r>
               <a:rPr lang="ru-RU" dirty="0" smtClean="0"/>
-              <a:t>Выход из игры на данный момент осуществляется </a:t>
-            </a:r>
-            <a:r>
-              <a:rPr lang="ru-RU" dirty="0" smtClean="0"/>
-              <a:t>отключением питания дисплея</a:t>
+              <a:t>Выход из игры на данный момент осуществляется отключением питания дисплея</a:t>
             </a:r>
             <a:endParaRPr lang="ru-RU" dirty="0"/>
           </a:p>

</xml_diff>

<commit_message>
add UML-diagram to presentation
</commit_message>
<xml_diff>
--- a/Ball/ЭВМ.pptx
+++ b/Ball/ЭВМ.pptx
@@ -11,10 +11,11 @@
     <p:sldId id="259" r:id="rId5"/>
     <p:sldId id="260" r:id="rId6"/>
     <p:sldId id="261" r:id="rId7"/>
-    <p:sldId id="262" r:id="rId8"/>
-    <p:sldId id="263" r:id="rId9"/>
-    <p:sldId id="264" r:id="rId10"/>
-    <p:sldId id="265" r:id="rId11"/>
+    <p:sldId id="266" r:id="rId8"/>
+    <p:sldId id="262" r:id="rId9"/>
+    <p:sldId id="263" r:id="rId10"/>
+    <p:sldId id="264" r:id="rId11"/>
+    <p:sldId id="265" r:id="rId12"/>
   </p:sldIdLst>
   <p:sldSz cx="12192000" cy="6858000"/>
   <p:notesSz cx="6858000" cy="9144000"/>
@@ -6249,6 +6250,166 @@
           <a:bodyPr/>
           <a:lstStyle/>
           <a:p>
+            <a:r>
+              <a:rPr lang="ru-RU" dirty="0" smtClean="0"/>
+              <a:t>Демонстрация</a:t>
+            </a:r>
+            <a:endParaRPr lang="ru-RU" dirty="0"/>
+          </a:p>
+        </p:txBody>
+      </p:sp>
+      <p:pic>
+        <p:nvPicPr>
+          <p:cNvPr id="4" name="Объект 3"/>
+          <p:cNvPicPr>
+            <a:picLocks noGrp="1" noChangeAspect="1"/>
+          </p:cNvPicPr>
+          <p:nvPr>
+            <p:ph idx="1"/>
+          </p:nvPr>
+        </p:nvPicPr>
+        <p:blipFill>
+          <a:blip r:embed="rId2" cstate="print">
+            <a:extLst>
+              <a:ext uri="{28A0092B-C50C-407E-A947-70E740481C1C}">
+                <a14:useLocalDpi xmlns:a14="http://schemas.microsoft.com/office/drawing/2010/main" val="0"/>
+              </a:ext>
+            </a:extLst>
+          </a:blip>
+          <a:stretch>
+            <a:fillRect/>
+          </a:stretch>
+        </p:blipFill>
+        <p:spPr>
+          <a:xfrm rot="5400000">
+            <a:off x="3458128" y="2359588"/>
+            <a:ext cx="4400357" cy="3387678"/>
+          </a:xfrm>
+        </p:spPr>
+      </p:pic>
+      <p:pic>
+        <p:nvPicPr>
+          <p:cNvPr id="5" name="Рисунок 4"/>
+          <p:cNvPicPr>
+            <a:picLocks noChangeAspect="1"/>
+          </p:cNvPicPr>
+          <p:nvPr/>
+        </p:nvPicPr>
+        <p:blipFill>
+          <a:blip r:embed="rId3" cstate="print">
+            <a:extLst>
+              <a:ext uri="{28A0092B-C50C-407E-A947-70E740481C1C}">
+                <a14:useLocalDpi xmlns:a14="http://schemas.microsoft.com/office/drawing/2010/main" val="0"/>
+              </a:ext>
+            </a:extLst>
+          </a:blip>
+          <a:stretch>
+            <a:fillRect/>
+          </a:stretch>
+        </p:blipFill>
+        <p:spPr>
+          <a:xfrm>
+            <a:off x="8217445" y="1853248"/>
+            <a:ext cx="3666777" cy="4279698"/>
+          </a:xfrm>
+          <a:prstGeom prst="rect">
+            <a:avLst/>
+          </a:prstGeom>
+        </p:spPr>
+      </p:pic>
+      <p:pic>
+        <p:nvPicPr>
+          <p:cNvPr id="4098" name="Picture 2" descr="https://sun9-72.userapi.com/c856120/v856120317/190d72/FdZptWBvFC4.jpg"/>
+          <p:cNvPicPr>
+            <a:picLocks noChangeAspect="1" noChangeArrowheads="1"/>
+          </p:cNvPicPr>
+          <p:nvPr/>
+        </p:nvPicPr>
+        <p:blipFill>
+          <a:blip r:embed="rId4" cstate="print">
+            <a:extLst>
+              <a:ext uri="{28A0092B-C50C-407E-A947-70E740481C1C}">
+                <a14:useLocalDpi xmlns:a14="http://schemas.microsoft.com/office/drawing/2010/main" val="0"/>
+              </a:ext>
+            </a:extLst>
+          </a:blip>
+          <a:srcRect/>
+          <a:stretch>
+            <a:fillRect/>
+          </a:stretch>
+        </p:blipFill>
+        <p:spPr bwMode="auto">
+          <a:xfrm>
+            <a:off x="129309" y="1853248"/>
+            <a:ext cx="3482974" cy="4400358"/>
+          </a:xfrm>
+          <a:prstGeom prst="rect">
+            <a:avLst/>
+          </a:prstGeom>
+          <a:noFill/>
+          <a:extLst>
+            <a:ext uri="{909E8E84-426E-40DD-AFC4-6F175D3DCCD1}">
+              <a14:hiddenFill xmlns:a14="http://schemas.microsoft.com/office/drawing/2010/main">
+                <a:solidFill>
+                  <a:srgbClr val="FFFFFF"/>
+                </a:solidFill>
+              </a14:hiddenFill>
+            </a:ext>
+          </a:extLst>
+        </p:spPr>
+      </p:pic>
+    </p:spTree>
+    <p:extLst>
+      <p:ext uri="{BB962C8B-B14F-4D97-AF65-F5344CB8AC3E}">
+        <p14:creationId xmlns:p14="http://schemas.microsoft.com/office/powerpoint/2010/main" val="1979622613"/>
+      </p:ext>
+    </p:extLst>
+  </p:cSld>
+  <p:clrMapOvr>
+    <a:masterClrMapping/>
+  </p:clrMapOvr>
+  <p:timing>
+    <p:tnLst>
+      <p:par>
+        <p:cTn id="1" dur="indefinite" restart="never" nodeType="tmRoot"/>
+      </p:par>
+    </p:tnLst>
+  </p:timing>
+</p:sld>
+</file>
+
+<file path=ppt/slides/slide11.xml><?xml version="1.0" encoding="utf-8"?>
+<p:sld xmlns:a="http://schemas.openxmlformats.org/drawingml/2006/main" xmlns:r="http://schemas.openxmlformats.org/officeDocument/2006/relationships" xmlns:p="http://schemas.openxmlformats.org/presentationml/2006/main">
+  <p:cSld>
+    <p:spTree>
+      <p:nvGrpSpPr>
+        <p:cNvPr id="1" name=""/>
+        <p:cNvGrpSpPr/>
+        <p:nvPr/>
+      </p:nvGrpSpPr>
+      <p:grpSpPr>
+        <a:xfrm>
+          <a:off x="0" y="0"/>
+          <a:ext cx="0" cy="0"/>
+          <a:chOff x="0" y="0"/>
+          <a:chExt cx="0" cy="0"/>
+        </a:xfrm>
+      </p:grpSpPr>
+      <p:sp>
+        <p:nvSpPr>
+          <p:cNvPr id="2" name="Заголовок 1"/>
+          <p:cNvSpPr>
+            <a:spLocks noGrp="1"/>
+          </p:cNvSpPr>
+          <p:nvPr>
+            <p:ph type="title"/>
+          </p:nvPr>
+        </p:nvSpPr>
+        <p:spPr/>
+        <p:txBody>
+          <a:bodyPr/>
+          <a:lstStyle/>
+          <a:p>
             <a:endParaRPr lang="ru-RU"/>
           </a:p>
         </p:txBody>
@@ -7454,33 +7615,48 @@
             <p:ph type="title"/>
           </p:nvPr>
         </p:nvSpPr>
-        <p:spPr>
-          <a:xfrm>
-            <a:off x="646111" y="452718"/>
-            <a:ext cx="9404723" cy="895791"/>
-          </a:xfrm>
-        </p:spPr>
+        <p:spPr/>
         <p:txBody>
           <a:bodyPr/>
           <a:lstStyle/>
           <a:p>
             <a:r>
               <a:rPr lang="ru-RU" dirty="0" smtClean="0"/>
-              <a:t>Программная архитектура проекта</a:t>
-            </a:r>
+              <a:t>Файловая архитектура проекта</a:t>
+            </a:r>
+            <a:endParaRPr lang="ru-RU" dirty="0"/>
+          </a:p>
+        </p:txBody>
+      </p:sp>
+      <p:sp>
+        <p:nvSpPr>
+          <p:cNvPr id="3" name="Объект 2"/>
+          <p:cNvSpPr>
+            <a:spLocks noGrp="1"/>
+          </p:cNvSpPr>
+          <p:nvPr>
+            <p:ph idx="1"/>
+          </p:nvPr>
+        </p:nvSpPr>
+        <p:spPr/>
+        <p:txBody>
+          <a:bodyPr/>
+          <a:lstStyle/>
+          <a:p>
+            <a:pPr marL="0" indent="0">
+              <a:buNone/>
+            </a:pPr>
             <a:endParaRPr lang="ru-RU" dirty="0"/>
           </a:p>
         </p:txBody>
       </p:sp>
       <p:pic>
         <p:nvPicPr>
-          <p:cNvPr id="4" name="Объект 3"/>
+          <p:cNvPr id="6" name="Рисунок 5"/>
           <p:cNvPicPr>
-            <a:picLocks noGrp="1" noChangeAspect="1"/>
+            <a:picLocks noChangeAspect="1"/>
           </p:cNvPicPr>
-          <p:nvPr>
-            <p:ph idx="1"/>
-          </p:nvPr>
+          <p:nvPr/>
         </p:nvPicPr>
         <p:blipFill>
           <a:blip r:embed="rId2"/>
@@ -7490,32 +7666,8 @@
         </p:blipFill>
         <p:spPr>
           <a:xfrm>
-            <a:off x="3546763" y="1422399"/>
-            <a:ext cx="6216073" cy="4927600"/>
-          </a:xfrm>
-          <a:prstGeom prst="rect">
-            <a:avLst/>
-          </a:prstGeom>
-        </p:spPr>
-      </p:pic>
-      <p:pic>
-        <p:nvPicPr>
-          <p:cNvPr id="5" name="Рисунок 4"/>
-          <p:cNvPicPr>
-            <a:picLocks noChangeAspect="1"/>
-          </p:cNvPicPr>
-          <p:nvPr/>
-        </p:nvPicPr>
-        <p:blipFill>
-          <a:blip r:embed="rId3"/>
-          <a:stretch>
-            <a:fillRect/>
-          </a:stretch>
-        </p:blipFill>
-        <p:spPr>
-          <a:xfrm>
-            <a:off x="3546763" y="5006110"/>
-            <a:ext cx="6216072" cy="1343889"/>
+            <a:off x="1302328" y="2595418"/>
+            <a:ext cx="7693890" cy="3288146"/>
           </a:xfrm>
           <a:prstGeom prst="rect">
             <a:avLst/>
@@ -7525,20 +7677,13 @@
     </p:spTree>
     <p:extLst>
       <p:ext uri="{BB962C8B-B14F-4D97-AF65-F5344CB8AC3E}">
-        <p14:creationId xmlns:p14="http://schemas.microsoft.com/office/powerpoint/2010/main" val="162673647"/>
+        <p14:creationId xmlns:p14="http://schemas.microsoft.com/office/powerpoint/2010/main" val="4272532730"/>
       </p:ext>
     </p:extLst>
   </p:cSld>
   <p:clrMapOvr>
     <a:masterClrMapping/>
   </p:clrMapOvr>
-  <p:timing>
-    <p:tnLst>
-      <p:par>
-        <p:cTn id="1" dur="indefinite" restart="never" nodeType="tmRoot"/>
-      </p:par>
-    </p:tnLst>
-  </p:timing>
 </p:sld>
 </file>
 
@@ -7569,77 +7714,57 @@
             <p:ph type="title"/>
           </p:nvPr>
         </p:nvSpPr>
-        <p:spPr/>
+        <p:spPr>
+          <a:xfrm>
+            <a:off x="646111" y="452718"/>
+            <a:ext cx="9404723" cy="895791"/>
+          </a:xfrm>
+        </p:spPr>
         <p:txBody>
           <a:bodyPr/>
           <a:lstStyle/>
           <a:p>
             <a:r>
               <a:rPr lang="ru-RU" dirty="0" smtClean="0"/>
-              <a:t>Инструкция по эксплуатации</a:t>
+              <a:t>Программная архитектура проекта</a:t>
             </a:r>
             <a:endParaRPr lang="ru-RU" dirty="0"/>
           </a:p>
         </p:txBody>
       </p:sp>
-      <p:sp>
-        <p:nvSpPr>
-          <p:cNvPr id="3" name="Объект 2"/>
-          <p:cNvSpPr>
-            <a:spLocks noGrp="1"/>
-          </p:cNvSpPr>
+      <p:pic>
+        <p:nvPicPr>
+          <p:cNvPr id="7" name="Объект 6"/>
+          <p:cNvPicPr>
+            <a:picLocks noGrp="1" noChangeAspect="1"/>
+          </p:cNvPicPr>
           <p:nvPr>
             <p:ph idx="1"/>
           </p:nvPr>
-        </p:nvSpPr>
-        <p:spPr/>
-        <p:txBody>
-          <a:bodyPr/>
-          <a:lstStyle/>
-          <a:p>
-            <a:pPr marL="0" indent="0">
-              <a:buNone/>
-            </a:pPr>
-            <a:r>
-              <a:rPr lang="ru-RU" dirty="0" smtClean="0"/>
-              <a:t>При включении игры выводится название игры и текущий уровень</a:t>
-            </a:r>
-            <a:endParaRPr lang="en-US" dirty="0"/>
-          </a:p>
-          <a:p>
-            <a:pPr marL="0" indent="0">
-              <a:buNone/>
-            </a:pPr>
-            <a:r>
-              <a:rPr lang="ru-RU" dirty="0" smtClean="0"/>
-              <a:t>Пользователь с помощью кнопок управляет мячом , доводя его до финиша(фиолетового квадрата)</a:t>
-            </a:r>
-          </a:p>
-          <a:p>
-            <a:pPr marL="0" indent="0">
-              <a:buNone/>
-            </a:pPr>
-            <a:r>
-              <a:rPr lang="ru-RU" dirty="0" smtClean="0"/>
-              <a:t>Далее его переводят на новый уровень и так он может проходить бесконечное количество уровней ,развивая свое мышление</a:t>
-            </a:r>
-          </a:p>
-          <a:p>
-            <a:pPr marL="0" indent="0">
-              <a:buNone/>
-            </a:pPr>
-            <a:r>
-              <a:rPr lang="ru-RU" dirty="0" smtClean="0"/>
-              <a:t>Выход из игры на данный момент осуществляется отключением питания дисплея</a:t>
-            </a:r>
-            <a:endParaRPr lang="ru-RU" dirty="0"/>
-          </a:p>
-        </p:txBody>
-      </p:sp>
+        </p:nvPicPr>
+        <p:blipFill>
+          <a:blip r:embed="rId2">
+            <a:extLst>
+              <a:ext uri="{28A0092B-C50C-407E-A947-70E740481C1C}">
+                <a14:useLocalDpi xmlns:a14="http://schemas.microsoft.com/office/drawing/2010/main" val="0"/>
+              </a:ext>
+            </a:extLst>
+          </a:blip>
+          <a:stretch>
+            <a:fillRect/>
+          </a:stretch>
+        </p:blipFill>
+        <p:spPr>
+          <a:xfrm>
+            <a:off x="3272392" y="1459345"/>
+            <a:ext cx="8032917" cy="5089235"/>
+          </a:xfrm>
+        </p:spPr>
+      </p:pic>
     </p:spTree>
     <p:extLst>
       <p:ext uri="{BB962C8B-B14F-4D97-AF65-F5344CB8AC3E}">
-        <p14:creationId xmlns:p14="http://schemas.microsoft.com/office/powerpoint/2010/main" val="2760289383"/>
+        <p14:creationId xmlns:p14="http://schemas.microsoft.com/office/powerpoint/2010/main" val="162673647"/>
       </p:ext>
     </p:extLst>
   </p:cSld>
@@ -7690,116 +7815,70 @@
           <a:p>
             <a:r>
               <a:rPr lang="ru-RU" dirty="0" smtClean="0"/>
-              <a:t>Демонстрация</a:t>
+              <a:t>Инструкция по эксплуатации</a:t>
             </a:r>
             <a:endParaRPr lang="ru-RU" dirty="0"/>
           </a:p>
         </p:txBody>
       </p:sp>
-      <p:pic>
-        <p:nvPicPr>
-          <p:cNvPr id="4" name="Объект 3"/>
-          <p:cNvPicPr>
-            <a:picLocks noGrp="1" noChangeAspect="1"/>
-          </p:cNvPicPr>
+      <p:sp>
+        <p:nvSpPr>
+          <p:cNvPr id="3" name="Объект 2"/>
+          <p:cNvSpPr>
+            <a:spLocks noGrp="1"/>
+          </p:cNvSpPr>
           <p:nvPr>
             <p:ph idx="1"/>
           </p:nvPr>
-        </p:nvPicPr>
-        <p:blipFill>
-          <a:blip r:embed="rId2" cstate="print">
-            <a:extLst>
-              <a:ext uri="{28A0092B-C50C-407E-A947-70E740481C1C}">
-                <a14:useLocalDpi xmlns:a14="http://schemas.microsoft.com/office/drawing/2010/main" val="0"/>
-              </a:ext>
-            </a:extLst>
-          </a:blip>
-          <a:stretch>
-            <a:fillRect/>
-          </a:stretch>
-        </p:blipFill>
-        <p:spPr>
-          <a:xfrm rot="5400000">
-            <a:off x="3458128" y="2359588"/>
-            <a:ext cx="4400357" cy="3387678"/>
-          </a:xfrm>
-        </p:spPr>
-      </p:pic>
-      <p:pic>
-        <p:nvPicPr>
-          <p:cNvPr id="5" name="Рисунок 4"/>
-          <p:cNvPicPr>
-            <a:picLocks noChangeAspect="1"/>
-          </p:cNvPicPr>
-          <p:nvPr/>
-        </p:nvPicPr>
-        <p:blipFill>
-          <a:blip r:embed="rId3" cstate="print">
-            <a:extLst>
-              <a:ext uri="{28A0092B-C50C-407E-A947-70E740481C1C}">
-                <a14:useLocalDpi xmlns:a14="http://schemas.microsoft.com/office/drawing/2010/main" val="0"/>
-              </a:ext>
-            </a:extLst>
-          </a:blip>
-          <a:stretch>
-            <a:fillRect/>
-          </a:stretch>
-        </p:blipFill>
-        <p:spPr>
-          <a:xfrm>
-            <a:off x="8217445" y="1853248"/>
-            <a:ext cx="3666777" cy="4279698"/>
-          </a:xfrm>
-          <a:prstGeom prst="rect">
-            <a:avLst/>
-          </a:prstGeom>
-        </p:spPr>
-      </p:pic>
-      <p:pic>
-        <p:nvPicPr>
-          <p:cNvPr id="4098" name="Picture 2" descr="https://sun9-72.userapi.com/c856120/v856120317/190d72/FdZptWBvFC4.jpg"/>
-          <p:cNvPicPr>
-            <a:picLocks noChangeAspect="1" noChangeArrowheads="1"/>
-          </p:cNvPicPr>
-          <p:nvPr/>
-        </p:nvPicPr>
-        <p:blipFill>
-          <a:blip r:embed="rId4" cstate="print">
-            <a:extLst>
-              <a:ext uri="{28A0092B-C50C-407E-A947-70E740481C1C}">
-                <a14:useLocalDpi xmlns:a14="http://schemas.microsoft.com/office/drawing/2010/main" val="0"/>
-              </a:ext>
-            </a:extLst>
-          </a:blip>
-          <a:srcRect/>
-          <a:stretch>
-            <a:fillRect/>
-          </a:stretch>
-        </p:blipFill>
-        <p:spPr bwMode="auto">
-          <a:xfrm>
-            <a:off x="129309" y="1853248"/>
-            <a:ext cx="3482974" cy="4400358"/>
-          </a:xfrm>
-          <a:prstGeom prst="rect">
-            <a:avLst/>
-          </a:prstGeom>
-          <a:noFill/>
-          <a:extLst>
-            <a:ext uri="{909E8E84-426E-40DD-AFC4-6F175D3DCCD1}">
-              <a14:hiddenFill xmlns:a14="http://schemas.microsoft.com/office/drawing/2010/main">
-                <a:solidFill>
-                  <a:srgbClr val="FFFFFF"/>
-                </a:solidFill>
-              </a14:hiddenFill>
-            </a:ext>
-          </a:extLst>
-        </p:spPr>
-      </p:pic>
+        </p:nvSpPr>
+        <p:spPr/>
+        <p:txBody>
+          <a:bodyPr/>
+          <a:lstStyle/>
+          <a:p>
+            <a:pPr marL="0" indent="0">
+              <a:buNone/>
+            </a:pPr>
+            <a:r>
+              <a:rPr lang="ru-RU" dirty="0" smtClean="0"/>
+              <a:t>При включении игры выводится название игры и текущий уровень</a:t>
+            </a:r>
+            <a:endParaRPr lang="en-US" dirty="0"/>
+          </a:p>
+          <a:p>
+            <a:pPr marL="0" indent="0">
+              <a:buNone/>
+            </a:pPr>
+            <a:r>
+              <a:rPr lang="ru-RU" dirty="0" smtClean="0"/>
+              <a:t>Пользователь с помощью кнопок управляет мячом , доводя его до финиша(фиолетового квадрата)</a:t>
+            </a:r>
+          </a:p>
+          <a:p>
+            <a:pPr marL="0" indent="0">
+              <a:buNone/>
+            </a:pPr>
+            <a:r>
+              <a:rPr lang="ru-RU" dirty="0" smtClean="0"/>
+              <a:t>Далее его переводят на новый уровень и так он может проходить бесконечное количество уровней ,развивая свое мышление</a:t>
+            </a:r>
+          </a:p>
+          <a:p>
+            <a:pPr marL="0" indent="0">
+              <a:buNone/>
+            </a:pPr>
+            <a:r>
+              <a:rPr lang="ru-RU" dirty="0" smtClean="0"/>
+              <a:t>Выход из игры на данный момент осуществляется отключением питания дисплея</a:t>
+            </a:r>
+            <a:endParaRPr lang="ru-RU" dirty="0"/>
+          </a:p>
+        </p:txBody>
+      </p:sp>
     </p:spTree>
     <p:extLst>
       <p:ext uri="{BB962C8B-B14F-4D97-AF65-F5344CB8AC3E}">
-        <p14:creationId xmlns:p14="http://schemas.microsoft.com/office/powerpoint/2010/main" val="1979622613"/>
+        <p14:creationId xmlns:p14="http://schemas.microsoft.com/office/powerpoint/2010/main" val="2760289383"/>
       </p:ext>
     </p:extLst>
   </p:cSld>

</xml_diff>